<commit_message>
Aggiornata slide "Architettura degli Shard MongoDB" aggiungendo la descrizione delle interfacce di input output
</commit_message>
<xml_diff>
--- a/Docs/Presentazione.PPTX
+++ b/Docs/Presentazione.PPTX
@@ -134,7 +134,18 @@
   </p:defaultTextStyle>
   <p:extLst>
     <p:ext uri="{EFAFB233-063F-42B5-8137-9DF3F51BA10A}">
-      <p15:sldGuideLst xmlns:p15="http://schemas.microsoft.com/office/powerpoint/2012/main" xmlns=""/>
+      <p15:sldGuideLst xmlns:p15="http://schemas.microsoft.com/office/powerpoint/2012/main">
+        <p15:guide id="1" orient="horz" pos="2160">
+          <p15:clr>
+            <a:srgbClr val="A4A3A4"/>
+          </p15:clr>
+        </p15:guide>
+        <p15:guide id="2" pos="3840">
+          <p15:clr>
+            <a:srgbClr val="A4A3A4"/>
+          </p15:clr>
+        </p15:guide>
+      </p15:sldGuideLst>
     </p:ext>
   </p:extLst>
 </p:presentation>
@@ -885,7 +896,7 @@
           <a:p>
             <a:fld id="{3F960570-40D4-4251-9C9D-483363F27B24}" type="datetimeFigureOut">
               <a:rPr lang="it-IT" smtClean="0"/>
-              <a:t>10/05/2020</a:t>
+              <a:t>11/05/2020</a:t>
             </a:fld>
             <a:endParaRPr lang="it-IT"/>
           </a:p>
@@ -1136,7 +1147,7 @@
           <a:p>
             <a:fld id="{3F960570-40D4-4251-9C9D-483363F27B24}" type="datetimeFigureOut">
               <a:rPr lang="it-IT" smtClean="0"/>
-              <a:t>10/05/2020</a:t>
+              <a:t>11/05/2020</a:t>
             </a:fld>
             <a:endParaRPr lang="it-IT"/>
           </a:p>
@@ -1450,7 +1461,7 @@
           <a:p>
             <a:fld id="{3F960570-40D4-4251-9C9D-483363F27B24}" type="datetimeFigureOut">
               <a:rPr lang="it-IT" smtClean="0"/>
-              <a:t>10/05/2020</a:t>
+              <a:t>11/05/2020</a:t>
             </a:fld>
             <a:endParaRPr lang="it-IT"/>
           </a:p>
@@ -1783,7 +1794,7 @@
           <a:p>
             <a:fld id="{3F960570-40D4-4251-9C9D-483363F27B24}" type="datetimeFigureOut">
               <a:rPr lang="it-IT" smtClean="0"/>
-              <a:t>10/05/2020</a:t>
+              <a:t>11/05/2020</a:t>
             </a:fld>
             <a:endParaRPr lang="it-IT"/>
           </a:p>
@@ -2097,7 +2108,7 @@
           <a:p>
             <a:fld id="{3F960570-40D4-4251-9C9D-483363F27B24}" type="datetimeFigureOut">
               <a:rPr lang="it-IT" smtClean="0"/>
-              <a:t>10/05/2020</a:t>
+              <a:t>11/05/2020</a:t>
             </a:fld>
             <a:endParaRPr lang="it-IT"/>
           </a:p>
@@ -2490,7 +2501,7 @@
           <a:p>
             <a:fld id="{3F960570-40D4-4251-9C9D-483363F27B24}" type="datetimeFigureOut">
               <a:rPr lang="it-IT" smtClean="0"/>
-              <a:t>10/05/2020</a:t>
+              <a:t>11/05/2020</a:t>
             </a:fld>
             <a:endParaRPr lang="it-IT"/>
           </a:p>
@@ -2660,7 +2671,7 @@
           <a:p>
             <a:fld id="{3F960570-40D4-4251-9C9D-483363F27B24}" type="datetimeFigureOut">
               <a:rPr lang="it-IT" smtClean="0"/>
-              <a:t>10/05/2020</a:t>
+              <a:t>11/05/2020</a:t>
             </a:fld>
             <a:endParaRPr lang="it-IT"/>
           </a:p>
@@ -2840,7 +2851,7 @@
           <a:p>
             <a:fld id="{3F960570-40D4-4251-9C9D-483363F27B24}" type="datetimeFigureOut">
               <a:rPr lang="it-IT" smtClean="0"/>
-              <a:t>10/05/2020</a:t>
+              <a:t>11/05/2020</a:t>
             </a:fld>
             <a:endParaRPr lang="it-IT"/>
           </a:p>
@@ -3010,7 +3021,7 @@
           <a:p>
             <a:fld id="{3F960570-40D4-4251-9C9D-483363F27B24}" type="datetimeFigureOut">
               <a:rPr lang="it-IT" smtClean="0"/>
-              <a:t>10/05/2020</a:t>
+              <a:t>11/05/2020</a:t>
             </a:fld>
             <a:endParaRPr lang="it-IT"/>
           </a:p>
@@ -3257,7 +3268,7 @@
           <a:p>
             <a:fld id="{3F960570-40D4-4251-9C9D-483363F27B24}" type="datetimeFigureOut">
               <a:rPr lang="it-IT" smtClean="0"/>
-              <a:t>10/05/2020</a:t>
+              <a:t>11/05/2020</a:t>
             </a:fld>
             <a:endParaRPr lang="it-IT"/>
           </a:p>
@@ -3489,7 +3500,7 @@
           <a:p>
             <a:fld id="{3F960570-40D4-4251-9C9D-483363F27B24}" type="datetimeFigureOut">
               <a:rPr lang="it-IT" smtClean="0"/>
-              <a:t>10/05/2020</a:t>
+              <a:t>11/05/2020</a:t>
             </a:fld>
             <a:endParaRPr lang="it-IT"/>
           </a:p>
@@ -3863,7 +3874,7 @@
           <a:p>
             <a:fld id="{3F960570-40D4-4251-9C9D-483363F27B24}" type="datetimeFigureOut">
               <a:rPr lang="it-IT" smtClean="0"/>
-              <a:t>10/05/2020</a:t>
+              <a:t>11/05/2020</a:t>
             </a:fld>
             <a:endParaRPr lang="it-IT"/>
           </a:p>
@@ -3986,7 +3997,7 @@
           <a:p>
             <a:fld id="{3F960570-40D4-4251-9C9D-483363F27B24}" type="datetimeFigureOut">
               <a:rPr lang="it-IT" smtClean="0"/>
-              <a:t>10/05/2020</a:t>
+              <a:t>11/05/2020</a:t>
             </a:fld>
             <a:endParaRPr lang="it-IT"/>
           </a:p>
@@ -4081,7 +4092,7 @@
           <a:p>
             <a:fld id="{3F960570-40D4-4251-9C9D-483363F27B24}" type="datetimeFigureOut">
               <a:rPr lang="it-IT" smtClean="0"/>
-              <a:t>10/05/2020</a:t>
+              <a:t>11/05/2020</a:t>
             </a:fld>
             <a:endParaRPr lang="it-IT"/>
           </a:p>
@@ -4336,7 +4347,7 @@
           <a:p>
             <a:fld id="{3F960570-40D4-4251-9C9D-483363F27B24}" type="datetimeFigureOut">
               <a:rPr lang="it-IT" smtClean="0"/>
-              <a:t>10/05/2020</a:t>
+              <a:t>11/05/2020</a:t>
             </a:fld>
             <a:endParaRPr lang="it-IT"/>
           </a:p>
@@ -4641,7 +4652,7 @@
           <a:p>
             <a:fld id="{3F960570-40D4-4251-9C9D-483363F27B24}" type="datetimeFigureOut">
               <a:rPr lang="it-IT" smtClean="0"/>
-              <a:t>10/05/2020</a:t>
+              <a:t>11/05/2020</a:t>
             </a:fld>
             <a:endParaRPr lang="it-IT"/>
           </a:p>
@@ -5343,7 +5354,7 @@
           <a:p>
             <a:fld id="{3F960570-40D4-4251-9C9D-483363F27B24}" type="datetimeFigureOut">
               <a:rPr lang="it-IT" smtClean="0"/>
-              <a:t>10/05/2020</a:t>
+              <a:t>11/05/2020</a:t>
             </a:fld>
             <a:endParaRPr lang="it-IT"/>
           </a:p>
@@ -5968,71 +5979,21 @@
                 <a:latin typeface="Palatino Linotype"/>
                 <a:cs typeface="Arial" charset="0"/>
               </a:rPr>
-              <a:t>928995 </a:t>
-            </a:r>
-            <a:r>
-              <a:rPr lang="it-IT" altLang="it-IT" sz="1600" b="1" dirty="0" err="1" smtClean="0">
+              <a:t>928995 Racanati Amedeo </a:t>
+            </a:r>
+            <a:r>
+              <a:rPr lang="it-IT" sz="1600" dirty="0"/>
+              <a:t>928869 </a:t>
+            </a:r>
+            <a:r>
+              <a:rPr lang="it-IT" altLang="it-IT" sz="1600" b="1" dirty="0" smtClean="0">
                 <a:solidFill>
                   <a:prstClr val="black"/>
                 </a:solidFill>
                 <a:latin typeface="Palatino Linotype"/>
                 <a:cs typeface="Arial" charset="0"/>
               </a:rPr>
-              <a:t>Racanati</a:t>
-            </a:r>
-            <a:r>
-              <a:rPr lang="it-IT" altLang="it-IT" sz="1600" b="1" dirty="0" smtClean="0">
-                <a:solidFill>
-                  <a:prstClr val="black"/>
-                </a:solidFill>
-                <a:latin typeface="Palatino Linotype"/>
-                <a:cs typeface="Arial" charset="0"/>
-              </a:rPr>
-              <a:t> Amedeo </a:t>
-            </a:r>
-            <a:r>
-              <a:rPr lang="it-IT" sz="1600" dirty="0"/>
-              <a:t>928869 </a:t>
-            </a:r>
-            <a:r>
-              <a:rPr lang="it-IT" altLang="it-IT" sz="1600" b="1" dirty="0" err="1" smtClean="0">
-                <a:solidFill>
-                  <a:prstClr val="black"/>
-                </a:solidFill>
-                <a:latin typeface="Palatino Linotype"/>
-                <a:cs typeface="Arial" charset="0"/>
-              </a:rPr>
-              <a:t>Sansonetti</a:t>
-            </a:r>
-            <a:r>
-              <a:rPr lang="it-IT" altLang="it-IT" sz="1600" b="1" dirty="0" smtClean="0">
-                <a:solidFill>
-                  <a:prstClr val="black"/>
-                </a:solidFill>
-                <a:latin typeface="Palatino Linotype"/>
-                <a:cs typeface="Arial" charset="0"/>
-              </a:rPr>
-              <a:t> </a:t>
-            </a:r>
-            <a:r>
-              <a:rPr lang="it-IT" altLang="it-IT" sz="1600" b="1" dirty="0" smtClean="0">
-                <a:solidFill>
-                  <a:prstClr val="black"/>
-                </a:solidFill>
-                <a:latin typeface="Palatino Linotype"/>
-                <a:cs typeface="Arial" charset="0"/>
-              </a:rPr>
-              <a:t>Angelo </a:t>
-            </a:r>
-            <a:r>
-              <a:rPr lang="it-IT" altLang="it-IT" sz="1600" b="1" dirty="0" smtClean="0">
-                <a:solidFill>
-                  <a:prstClr val="black"/>
-                </a:solidFill>
-                <a:latin typeface="Palatino Linotype"/>
-                <a:cs typeface="Arial" charset="0"/>
-              </a:rPr>
-              <a:t>Pio</a:t>
+              <a:t>Sansonetti Angelo Pio</a:t>
             </a:r>
             <a:r>
               <a:rPr lang="it-IT" altLang="it-IT" sz="1600" dirty="0">
@@ -9584,25 +9545,6 @@
           </a:prstGeom>
         </p:spPr>
       </p:pic>
-      <p:sp>
-        <p:nvSpPr>
-          <p:cNvPr id="2" name="Segnaposto piè di pagina 1"/>
-          <p:cNvSpPr>
-            <a:spLocks noGrp="1"/>
-          </p:cNvSpPr>
-          <p:nvPr>
-            <p:ph type="ftr" sz="quarter" idx="11"/>
-          </p:nvPr>
-        </p:nvSpPr>
-        <p:spPr/>
-        <p:txBody>
-          <a:bodyPr/>
-          <a:lstStyle/>
-          <a:p>
-            <a:endParaRPr lang="it-IT" dirty="0"/>
-          </a:p>
-        </p:txBody>
-      </p:sp>
     </p:spTree>
     <p:extLst>
       <p:ext uri="{BB962C8B-B14F-4D97-AF65-F5344CB8AC3E}">
@@ -9742,29 +9684,6 @@
           </a:p>
         </p:txBody>
       </p:sp>
-      <p:sp>
-        <p:nvSpPr>
-          <p:cNvPr id="5" name="Segnaposto piè di pagina 4"/>
-          <p:cNvSpPr>
-            <a:spLocks noGrp="1"/>
-          </p:cNvSpPr>
-          <p:nvPr>
-            <p:ph type="ftr" sz="quarter" idx="11"/>
-          </p:nvPr>
-        </p:nvSpPr>
-        <p:spPr/>
-        <p:txBody>
-          <a:bodyPr/>
-          <a:lstStyle/>
-          <a:p>
-            <a:r>
-              <a:rPr lang="it-IT" smtClean="0"/>
-              <a:t>sdsadasd</a:t>
-            </a:r>
-            <a:endParaRPr lang="it-IT"/>
-          </a:p>
-        </p:txBody>
-      </p:sp>
     </p:spTree>
     <p:extLst>
       <p:ext uri="{BB962C8B-B14F-4D97-AF65-F5344CB8AC3E}">
@@ -9832,15 +9751,7 @@
             </a:r>
             <a:r>
               <a:rPr lang="it-IT" dirty="0"/>
-              <a:t>dei </a:t>
-            </a:r>
-            <a:r>
-              <a:rPr lang="it-IT" dirty="0" err="1"/>
-              <a:t>tweet</a:t>
-            </a:r>
-            <a:r>
-              <a:rPr lang="it-IT" dirty="0"/>
-              <a:t> di oltre il 50</a:t>
+              <a:t>dei tweet di oltre il 50</a:t>
             </a:r>
             <a:r>
               <a:rPr lang="it-IT" dirty="0" smtClean="0"/>
@@ -9881,15 +9792,7 @@
             </a:r>
             <a:r>
               <a:rPr lang="it-IT" dirty="0" smtClean="0"/>
-              <a:t>cluster in </a:t>
-            </a:r>
-            <a:r>
-              <a:rPr lang="it-IT" dirty="0" err="1" smtClean="0"/>
-              <a:t>mongodb</a:t>
-            </a:r>
-            <a:r>
-              <a:rPr lang="it-IT" dirty="0" smtClean="0"/>
-              <a:t> </a:t>
+              <a:t>cluster in mongodb </a:t>
             </a:r>
             <a:r>
               <a:rPr lang="it-IT" dirty="0"/>
@@ -9901,15 +9804,7 @@
             </a:r>
             <a:r>
               <a:rPr lang="it-IT" dirty="0"/>
-              <a:t>necessità di dover suddividere i dati nei 3 </a:t>
-            </a:r>
-            <a:r>
-              <a:rPr lang="it-IT" dirty="0" err="1"/>
-              <a:t>shard</a:t>
-            </a:r>
-            <a:r>
-              <a:rPr lang="it-IT" dirty="0"/>
-              <a:t>.</a:t>
+              <a:t>necessità di dover suddividere i dati nei 3 shard.</a:t>
             </a:r>
           </a:p>
         </p:txBody>
@@ -10033,34 +9928,13 @@
             </a:r>
             <a:r>
               <a:rPr lang="it-IT" sz="1400" dirty="0" smtClean="0"/>
-              <a:t>analisi </a:t>
-            </a:r>
-            <a:r>
-              <a:rPr lang="it-IT" sz="1400" dirty="0" err="1" smtClean="0"/>
-              <a:t>tweets</a:t>
-            </a:r>
-            <a:endParaRPr lang="it-IT" sz="1400" dirty="0" smtClean="0"/>
+              <a:t>analisi tweets</a:t>
+            </a:r>
           </a:p>
           <a:p>
             <a:r>
               <a:rPr lang="it-IT" sz="1400" dirty="0" smtClean="0"/>
-              <a:t>- </a:t>
-            </a:r>
-            <a:r>
-              <a:rPr lang="it-IT" sz="1400" dirty="0" err="1" smtClean="0"/>
-              <a:t>Primary</a:t>
-            </a:r>
-            <a:r>
-              <a:rPr lang="it-IT" sz="1400" dirty="0" smtClean="0"/>
-              <a:t> </a:t>
-            </a:r>
-            <a:r>
-              <a:rPr lang="it-IT" sz="1400" dirty="0" err="1" smtClean="0"/>
-              <a:t>node</a:t>
-            </a:r>
-            <a:r>
-              <a:rPr lang="it-IT" sz="1400" dirty="0" smtClean="0"/>
-              <a:t>:</a:t>
+              <a:t>- Primary node:</a:t>
             </a:r>
             <a:r>
               <a:rPr lang="it-IT" sz="1400" dirty="0"/>
@@ -10070,12 +9944,8 @@
               <a:rPr lang="it-IT" sz="1400" dirty="0"/>
             </a:br>
             <a:r>
-              <a:rPr lang="it-IT" sz="1400" dirty="0" err="1"/>
-              <a:t>Cpu</a:t>
-            </a:r>
-            <a:r>
               <a:rPr lang="it-IT" sz="1400" dirty="0"/>
-              <a:t> 33</a:t>
+              <a:t>Cpu 33</a:t>
             </a:r>
             <a:r>
               <a:rPr lang="it-IT" sz="1400" dirty="0" smtClean="0"/>
@@ -10097,33 +9967,13 @@
             </a:br>
             <a:r>
               <a:rPr lang="it-IT" sz="1400" dirty="0" smtClean="0"/>
-              <a:t>- </a:t>
-            </a:r>
-            <a:r>
-              <a:rPr lang="it-IT" sz="1400" dirty="0" err="1" smtClean="0"/>
-              <a:t>Secondary</a:t>
-            </a:r>
+              <a:t>- Secondary node:</a:t>
+            </a:r>
+          </a:p>
+          <a:p>
             <a:r>
               <a:rPr lang="it-IT" sz="1400" dirty="0" smtClean="0"/>
-              <a:t> </a:t>
-            </a:r>
-            <a:r>
-              <a:rPr lang="it-IT" sz="1400" dirty="0" err="1" smtClean="0"/>
-              <a:t>node</a:t>
-            </a:r>
-            <a:r>
-              <a:rPr lang="it-IT" sz="1400" dirty="0" smtClean="0"/>
-              <a:t>:</a:t>
-            </a:r>
-          </a:p>
-          <a:p>
-            <a:r>
-              <a:rPr lang="it-IT" sz="1400" dirty="0" err="1" smtClean="0"/>
-              <a:t>Cpu</a:t>
-            </a:r>
-            <a:r>
-              <a:rPr lang="it-IT" sz="1400" dirty="0" smtClean="0"/>
-              <a:t> 39%</a:t>
+              <a:t>Cpu 39%</a:t>
             </a:r>
           </a:p>
           <a:p>
@@ -10177,26 +10027,14 @@
             </a:r>
             <a:r>
               <a:rPr lang="it-IT" sz="1400" dirty="0" smtClean="0"/>
-              <a:t>nalisi </a:t>
-            </a:r>
-            <a:r>
-              <a:rPr lang="it-IT" sz="1400" dirty="0" err="1" smtClean="0"/>
-              <a:t>tweets</a:t>
+              <a:t>nalisi tweets</a:t>
             </a:r>
             <a:endParaRPr lang="it-IT" sz="1400" dirty="0"/>
           </a:p>
           <a:p>
             <a:r>
               <a:rPr lang="it-IT" sz="1400" dirty="0" smtClean="0"/>
-              <a:t>Con </a:t>
-            </a:r>
-            <a:r>
-              <a:rPr lang="it-IT" sz="1400" dirty="0" err="1" smtClean="0"/>
-              <a:t>cpu</a:t>
-            </a:r>
-            <a:r>
-              <a:rPr lang="it-IT" sz="1400" dirty="0" smtClean="0"/>
-              <a:t> </a:t>
+              <a:t>Con cpu </a:t>
             </a:r>
             <a:r>
               <a:rPr lang="it-IT" sz="1400" dirty="0"/>
@@ -10283,23 +10121,7 @@
           <a:p>
             <a:r>
               <a:rPr lang="it-IT" sz="1000" dirty="0" smtClean="0"/>
-              <a:t>*</a:t>
-            </a:r>
-            <a:r>
-              <a:rPr lang="it-IT" sz="1000" dirty="0" err="1" smtClean="0"/>
-              <a:t>Primary</a:t>
-            </a:r>
-            <a:r>
-              <a:rPr lang="it-IT" sz="1000" dirty="0" smtClean="0"/>
-              <a:t> </a:t>
-            </a:r>
-            <a:r>
-              <a:rPr lang="it-IT" sz="1000" dirty="0" err="1" smtClean="0"/>
-              <a:t>working</a:t>
-            </a:r>
-            <a:r>
-              <a:rPr lang="it-IT" sz="1000" dirty="0" smtClean="0"/>
-              <a:t> set, ossia l'insieme </a:t>
+              <a:t>*Primary working set, ossia l'insieme </a:t>
             </a:r>
             <a:r>
               <a:rPr lang="it-IT" sz="1000" dirty="0"/>
@@ -10323,6 +10145,13 @@
   <p:clrMapOvr>
     <a:masterClrMapping/>
   </p:clrMapOvr>
+  <p:timing>
+    <p:tnLst>
+      <p:par>
+        <p:cTn id="1" dur="indefinite" restart="never" nodeType="tmRoot"/>
+      </p:par>
+    </p:tnLst>
+  </p:timing>
 </p:sld>
 </file>
 
@@ -10451,7 +10280,7 @@
         </p:nvSpPr>
         <p:spPr>
           <a:xfrm>
-            <a:off x="0" y="2762146"/>
+            <a:off x="-2" y="1716576"/>
             <a:ext cx="3932809" cy="1320800"/>
           </a:xfrm>
         </p:spPr>
@@ -10466,28 +10295,12 @@
               <a:rPr lang="it-IT" dirty="0" smtClean="0"/>
               <a:t>Architettura</a:t>
             </a:r>
-            <a:r>
-              <a:rPr lang="it-IT" dirty="0" smtClean="0"/>
-              <a:t/>
-            </a:r>
             <a:br>
               <a:rPr lang="it-IT" dirty="0" smtClean="0"/>
             </a:br>
             <a:r>
               <a:rPr lang="it-IT" dirty="0" smtClean="0"/>
-              <a:t>degli </a:t>
-            </a:r>
-            <a:r>
-              <a:rPr lang="it-IT" dirty="0" err="1" smtClean="0"/>
-              <a:t>shard</a:t>
-            </a:r>
-            <a:r>
-              <a:rPr lang="it-IT" dirty="0" smtClean="0"/>
-              <a:t> in </a:t>
-            </a:r>
-            <a:r>
-              <a:rPr lang="it-IT" dirty="0" err="1" smtClean="0"/>
-              <a:t>MongoDB</a:t>
+              <a:t>degli shard in MongoDB</a:t>
             </a:r>
             <a:endParaRPr lang="it-IT" dirty="0"/>
           </a:p>
@@ -10523,6 +10336,36 @@
           </a:prstGeom>
         </p:spPr>
       </p:pic>
+      <p:sp>
+        <p:nvSpPr>
+          <p:cNvPr id="2" name="CasellaDiTesto 1"/>
+          <p:cNvSpPr txBox="1"/>
+          <p:nvPr/>
+        </p:nvSpPr>
+        <p:spPr>
+          <a:xfrm>
+            <a:off x="396909" y="3622545"/>
+            <a:ext cx="3402072" cy="1200329"/>
+          </a:xfrm>
+          <a:prstGeom prst="rect">
+            <a:avLst/>
+          </a:prstGeom>
+          <a:noFill/>
+        </p:spPr>
+        <p:txBody>
+          <a:bodyPr wrap="square" rtlCol="0">
+            <a:spAutoFit/>
+          </a:bodyPr>
+          <a:lstStyle/>
+          <a:p>
+            <a:r>
+              <a:rPr lang="it-IT" dirty="0" smtClean="0"/>
+              <a:t>La comunicazione tra i due host è gestista mediante richieste HTTP POST con formato di scambio dati JSON. 	</a:t>
+            </a:r>
+            <a:endParaRPr lang="it-IT" dirty="0"/>
+          </a:p>
+        </p:txBody>
+      </p:sp>
     </p:spTree>
     <p:extLst>
       <p:ext uri="{BB962C8B-B14F-4D97-AF65-F5344CB8AC3E}">
@@ -10585,11 +10428,7 @@
             <a:pPr algn="ctr"/>
             <a:r>
               <a:rPr lang="it-IT" dirty="0" smtClean="0"/>
-              <a:t>Pipeline di elaborazione delle mappe in </a:t>
-            </a:r>
-            <a:r>
-              <a:rPr lang="it-IT" dirty="0" err="1" smtClean="0"/>
-              <a:t>MongoDB</a:t>
+              <a:t>Pipeline di elaborazione delle mappe in MongoDB</a:t>
             </a:r>
             <a:endParaRPr lang="it-IT" dirty="0"/>
           </a:p>
@@ -10646,6 +10485,13 @@
   <p:clrMapOvr>
     <a:masterClrMapping/>
   </p:clrMapOvr>
+  <p:timing>
+    <p:tnLst>
+      <p:par>
+        <p:cTn id="1" dur="indefinite" restart="never" nodeType="tmRoot"/>
+      </p:par>
+    </p:tnLst>
+  </p:timing>
 </p:sld>
 </file>
 
@@ -10671,7 +10517,7 @@
           <p:cNvPr id="5" name="Titolo 1">
             <a:extLst>
               <a:ext uri="{FF2B5EF4-FFF2-40B4-BE49-F238E27FC236}">
-                <a16:creationId xmlns:a16="http://schemas.microsoft.com/office/drawing/2014/main" xmlns="" id="{7B0C3D97-6237-4821-A89A-70162D11EE48}"/>
+                <a16:creationId xmlns:a16="http://schemas.microsoft.com/office/drawing/2014/main" id="{7B0C3D97-6237-4821-A89A-70162D11EE48}"/>
               </a:ext>
             </a:extLst>
           </p:cNvPr>
@@ -10794,7 +10640,7 @@
           <p:cNvPr id="6" name="Segnaposto contenuto 2">
             <a:extLst>
               <a:ext uri="{FF2B5EF4-FFF2-40B4-BE49-F238E27FC236}">
-                <a16:creationId xmlns:a16="http://schemas.microsoft.com/office/drawing/2014/main" xmlns="" id="{058AAC17-44C7-46C9-846C-ACC9953C05A1}"/>
+                <a16:creationId xmlns:a16="http://schemas.microsoft.com/office/drawing/2014/main" id="{058AAC17-44C7-46C9-846C-ACC9953C05A1}"/>
               </a:ext>
             </a:extLst>
           </p:cNvPr>
@@ -11049,40 +10895,13 @@
               <a:buNone/>
             </a:pPr>
             <a:r>
-              <a:rPr lang="it-IT" sz="2900" b="1" i="1" dirty="0" err="1" smtClean="0">
+              <a:rPr lang="it-IT" sz="2900" b="1" i="1" dirty="0" smtClean="0">
                 <a:solidFill>
                   <a:prstClr val="black"/>
                 </a:solidFill>
                 <a:cs typeface="Times New Roman" panose="02020603050405020304" pitchFamily="18" charset="0"/>
               </a:rPr>
-              <a:t>Hashtag</a:t>
-            </a:r>
-            <a:r>
-              <a:rPr lang="it-IT" sz="2900" b="1" i="1" dirty="0" smtClean="0">
-                <a:solidFill>
-                  <a:prstClr val="black"/>
-                </a:solidFill>
-                <a:cs typeface="Times New Roman" panose="02020603050405020304" pitchFamily="18" charset="0"/>
-              </a:rPr>
-              <a:t> </a:t>
-            </a:r>
-            <a:r>
-              <a:rPr lang="it-IT" sz="2900" b="1" i="1" dirty="0" err="1" smtClean="0">
-                <a:solidFill>
-                  <a:prstClr val="black"/>
-                </a:solidFill>
-                <a:cs typeface="Times New Roman" panose="02020603050405020304" pitchFamily="18" charset="0"/>
-              </a:rPr>
-              <a:t>Map</a:t>
-            </a:r>
-            <a:r>
-              <a:rPr lang="it-IT" sz="2900" b="1" i="1" dirty="0" smtClean="0">
-                <a:solidFill>
-                  <a:prstClr val="black"/>
-                </a:solidFill>
-                <a:cs typeface="Times New Roman" panose="02020603050405020304" pitchFamily="18" charset="0"/>
-              </a:rPr>
-              <a:t>:</a:t>
+              <a:t>Hashtag Map:</a:t>
             </a:r>
           </a:p>
           <a:p>
@@ -11128,25 +10947,7 @@
                 </a:solidFill>
                 <a:cs typeface="Times New Roman" panose="02020603050405020304" pitchFamily="18" charset="0"/>
               </a:rPr>
-              <a:t>per ciascun sentimento viene creata una mappa, che a sua volta contiene tante mappe per ciascun </a:t>
-            </a:r>
-            <a:r>
-              <a:rPr lang="it-IT" sz="1900" dirty="0" err="1" smtClean="0">
-                <a:solidFill>
-                  <a:prstClr val="black"/>
-                </a:solidFill>
-                <a:cs typeface="Times New Roman" panose="02020603050405020304" pitchFamily="18" charset="0"/>
-              </a:rPr>
-              <a:t>hashtag</a:t>
-            </a:r>
-            <a:r>
-              <a:rPr lang="it-IT" sz="1900" dirty="0" smtClean="0">
-                <a:solidFill>
-                  <a:prstClr val="black"/>
-                </a:solidFill>
-                <a:cs typeface="Times New Roman" panose="02020603050405020304" pitchFamily="18" charset="0"/>
-              </a:rPr>
-              <a:t> con relative frequenze</a:t>
+              <a:t>per ciascun sentimento viene creata una mappa, che a sua volta contiene tante mappe per ciascun hashtag con relative frequenze</a:t>
             </a:r>
             <a:endParaRPr lang="it-IT" sz="1900" dirty="0">
               <a:solidFill>
@@ -11162,7 +10963,7 @@
           <p:cNvPr id="7" name="Segnaposto contenuto 3">
             <a:extLst>
               <a:ext uri="{FF2B5EF4-FFF2-40B4-BE49-F238E27FC236}">
-                <a16:creationId xmlns:a16="http://schemas.microsoft.com/office/drawing/2014/main" xmlns="" id="{68B22042-CC38-489D-A7E5-BCC033D653FC}"/>
+                <a16:creationId xmlns:a16="http://schemas.microsoft.com/office/drawing/2014/main" id="{68B22042-CC38-489D-A7E5-BCC033D653FC}"/>
               </a:ext>
             </a:extLst>
           </p:cNvPr>
@@ -11417,40 +11218,13 @@
               <a:buNone/>
             </a:pPr>
             <a:r>
-              <a:rPr lang="it-IT" sz="2900" b="1" i="1" dirty="0" err="1" smtClean="0">
+              <a:rPr lang="it-IT" sz="2900" b="1" i="1" dirty="0" smtClean="0">
                 <a:solidFill>
                   <a:prstClr val="black"/>
                 </a:solidFill>
                 <a:cs typeface="Times New Roman" panose="02020603050405020304" pitchFamily="18" charset="0"/>
               </a:rPr>
-              <a:t>Emoji</a:t>
-            </a:r>
-            <a:r>
-              <a:rPr lang="it-IT" sz="2900" b="1" i="1" dirty="0" smtClean="0">
-                <a:solidFill>
-                  <a:prstClr val="black"/>
-                </a:solidFill>
-                <a:cs typeface="Times New Roman" panose="02020603050405020304" pitchFamily="18" charset="0"/>
-              </a:rPr>
-              <a:t> </a:t>
-            </a:r>
-            <a:r>
-              <a:rPr lang="it-IT" sz="2900" b="1" i="1" dirty="0" err="1" smtClean="0">
-                <a:solidFill>
-                  <a:prstClr val="black"/>
-                </a:solidFill>
-                <a:cs typeface="Times New Roman" panose="02020603050405020304" pitchFamily="18" charset="0"/>
-              </a:rPr>
-              <a:t>Map</a:t>
-            </a:r>
-            <a:r>
-              <a:rPr lang="it-IT" sz="2900" b="1" i="1" dirty="0" smtClean="0">
-                <a:solidFill>
-                  <a:prstClr val="black"/>
-                </a:solidFill>
-                <a:cs typeface="Times New Roman" panose="02020603050405020304" pitchFamily="18" charset="0"/>
-              </a:rPr>
-              <a:t>:</a:t>
+              <a:t>Emoji Map:</a:t>
             </a:r>
           </a:p>
           <a:p>
@@ -11525,22 +11299,13 @@
               <a:t>ciascuna </a:t>
             </a:r>
             <a:r>
-              <a:rPr lang="it-IT" sz="1900" dirty="0" err="1">
+              <a:rPr lang="it-IT" sz="1900" dirty="0">
                 <a:solidFill>
                   <a:prstClr val="black"/>
                 </a:solidFill>
                 <a:cs typeface="Times New Roman" panose="02020603050405020304" pitchFamily="18" charset="0"/>
               </a:rPr>
-              <a:t>emoji</a:t>
-            </a:r>
-            <a:r>
-              <a:rPr lang="it-IT" sz="1900" dirty="0">
-                <a:solidFill>
-                  <a:prstClr val="black"/>
-                </a:solidFill>
-                <a:cs typeface="Times New Roman" panose="02020603050405020304" pitchFamily="18" charset="0"/>
-              </a:rPr>
-              <a:t> o emoticon</a:t>
+              <a:t>emoji o emoticon</a:t>
             </a:r>
             <a:r>
               <a:rPr lang="it-IT" sz="1900" dirty="0" smtClean="0">
@@ -11575,7 +11340,7 @@
           <p:cNvPr id="9" name="Segnaposto contenuto 2">
             <a:extLst>
               <a:ext uri="{FF2B5EF4-FFF2-40B4-BE49-F238E27FC236}">
-                <a16:creationId xmlns:a16="http://schemas.microsoft.com/office/drawing/2014/main" xmlns="" id="{058AAC17-44C7-46C9-846C-ACC9953C05A1}"/>
+                <a16:creationId xmlns:a16="http://schemas.microsoft.com/office/drawing/2014/main" id="{058AAC17-44C7-46C9-846C-ACC9953C05A1}"/>
               </a:ext>
             </a:extLst>
           </p:cNvPr>
@@ -11608,16 +11373,7 @@
                 </a:solidFill>
                 <a:cs typeface="Times New Roman" panose="02020603050405020304" pitchFamily="18" charset="0"/>
               </a:rPr>
-              <a:t>Word </a:t>
-            </a:r>
-            <a:r>
-              <a:rPr lang="it-IT" sz="2900" b="1" i="1" dirty="0" err="1" smtClean="0">
-                <a:solidFill>
-                  <a:prstClr val="black"/>
-                </a:solidFill>
-                <a:cs typeface="Times New Roman" panose="02020603050405020304" pitchFamily="18" charset="0"/>
-              </a:rPr>
-              <a:t>Map</a:t>
+              <a:t>Word Map</a:t>
             </a:r>
             <a:r>
               <a:rPr lang="it-IT" sz="2900" b="1" i="1" dirty="0">
@@ -11671,16 +11427,7 @@
                 </a:solidFill>
                 <a:cs typeface="Times New Roman" panose="02020603050405020304" pitchFamily="18" charset="0"/>
               </a:rPr>
-              <a:t>per ciascuna parola relativa ad un sentimento viene generata una mappa relativa alla frequenza nei </a:t>
-            </a:r>
-            <a:r>
-              <a:rPr lang="it-IT" sz="1900" dirty="0" err="1" smtClean="0">
-                <a:solidFill>
-                  <a:prstClr val="black"/>
-                </a:solidFill>
-                <a:cs typeface="Times New Roman" panose="02020603050405020304" pitchFamily="18" charset="0"/>
-              </a:rPr>
-              <a:t>tweet</a:t>
+              <a:t>per ciascuna parola relativa ad un sentimento viene generata una mappa relativa alla frequenza nei tweet</a:t>
             </a:r>
             <a:endParaRPr lang="it-IT" sz="1900" dirty="0">
               <a:solidFill>
@@ -11701,6 +11448,13 @@
   <p:clrMapOvr>
     <a:masterClrMapping/>
   </p:clrMapOvr>
+  <p:timing>
+    <p:tnLst>
+      <p:par>
+        <p:cTn id="1" dur="indefinite" restart="never" nodeType="tmRoot"/>
+      </p:par>
+    </p:tnLst>
+  </p:timing>
 </p:sld>
 </file>
 
@@ -11877,21 +11631,21 @@
                 <a:gridCol w="2230361">
                   <a:extLst>
                     <a:ext uri="{9D8B030D-6E8A-4147-A177-3AD203B41FA5}">
-                      <a16:colId xmlns:a16="http://schemas.microsoft.com/office/drawing/2014/main" xmlns="" val="2877867300"/>
+                      <a16:colId xmlns:a16="http://schemas.microsoft.com/office/drawing/2014/main" val="2877867300"/>
                     </a:ext>
                   </a:extLst>
                 </a:gridCol>
                 <a:gridCol w="2946400">
                   <a:extLst>
                     <a:ext uri="{9D8B030D-6E8A-4147-A177-3AD203B41FA5}">
-                      <a16:colId xmlns:a16="http://schemas.microsoft.com/office/drawing/2014/main" xmlns="" val="674584734"/>
+                      <a16:colId xmlns:a16="http://schemas.microsoft.com/office/drawing/2014/main" val="674584734"/>
                     </a:ext>
                   </a:extLst>
                 </a:gridCol>
                 <a:gridCol w="4151085">
                   <a:extLst>
                     <a:ext uri="{9D8B030D-6E8A-4147-A177-3AD203B41FA5}">
-                      <a16:colId xmlns:a16="http://schemas.microsoft.com/office/drawing/2014/main" xmlns="" val="2074233569"/>
+                      <a16:colId xmlns:a16="http://schemas.microsoft.com/office/drawing/2014/main" val="2074233569"/>
                     </a:ext>
                   </a:extLst>
                 </a:gridCol>
@@ -11944,7 +11698,7 @@
                 </a:tc>
                 <a:extLst>
                   <a:ext uri="{0D108BD9-81ED-4DB2-BD59-A6C34878D82A}">
-                    <a16:rowId xmlns:a16="http://schemas.microsoft.com/office/drawing/2014/main" xmlns="" val="359061708"/>
+                    <a16:rowId xmlns:a16="http://schemas.microsoft.com/office/drawing/2014/main" val="359061708"/>
                   </a:ext>
                 </a:extLst>
               </a:tr>
@@ -12007,7 +11761,7 @@
                 </a:tc>
                 <a:extLst>
                   <a:ext uri="{0D108BD9-81ED-4DB2-BD59-A6C34878D82A}">
-                    <a16:rowId xmlns:a16="http://schemas.microsoft.com/office/drawing/2014/main" xmlns="" val="2152449656"/>
+                    <a16:rowId xmlns:a16="http://schemas.microsoft.com/office/drawing/2014/main" val="2152449656"/>
                   </a:ext>
                 </a:extLst>
               </a:tr>
@@ -12070,7 +11824,7 @@
                 </a:tc>
                 <a:extLst>
                   <a:ext uri="{0D108BD9-81ED-4DB2-BD59-A6C34878D82A}">
-                    <a16:rowId xmlns:a16="http://schemas.microsoft.com/office/drawing/2014/main" xmlns="" val="1860423358"/>
+                    <a16:rowId xmlns:a16="http://schemas.microsoft.com/office/drawing/2014/main" val="1860423358"/>
                   </a:ext>
                 </a:extLst>
               </a:tr>
@@ -12133,7 +11887,7 @@
                 </a:tc>
                 <a:extLst>
                   <a:ext uri="{0D108BD9-81ED-4DB2-BD59-A6C34878D82A}">
-                    <a16:rowId xmlns:a16="http://schemas.microsoft.com/office/drawing/2014/main" xmlns="" val="686662235"/>
+                    <a16:rowId xmlns:a16="http://schemas.microsoft.com/office/drawing/2014/main" val="686662235"/>
                   </a:ext>
                 </a:extLst>
               </a:tr>
@@ -12189,7 +11943,7 @@
                 </a:tc>
                 <a:extLst>
                   <a:ext uri="{0D108BD9-81ED-4DB2-BD59-A6C34878D82A}">
-                    <a16:rowId xmlns:a16="http://schemas.microsoft.com/office/drawing/2014/main" xmlns="" val="2723784576"/>
+                    <a16:rowId xmlns:a16="http://schemas.microsoft.com/office/drawing/2014/main" val="2723784576"/>
                   </a:ext>
                 </a:extLst>
               </a:tr>
@@ -12245,7 +11999,7 @@
                 </a:tc>
                 <a:extLst>
                   <a:ext uri="{0D108BD9-81ED-4DB2-BD59-A6C34878D82A}">
-                    <a16:rowId xmlns:a16="http://schemas.microsoft.com/office/drawing/2014/main" xmlns="" val="2943680178"/>
+                    <a16:rowId xmlns:a16="http://schemas.microsoft.com/office/drawing/2014/main" val="2943680178"/>
                   </a:ext>
                 </a:extLst>
               </a:tr>
@@ -12301,7 +12055,7 @@
                 </a:tc>
                 <a:extLst>
                   <a:ext uri="{0D108BD9-81ED-4DB2-BD59-A6C34878D82A}">
-                    <a16:rowId xmlns:a16="http://schemas.microsoft.com/office/drawing/2014/main" xmlns="" val="460836306"/>
+                    <a16:rowId xmlns:a16="http://schemas.microsoft.com/office/drawing/2014/main" val="460836306"/>
                   </a:ext>
                 </a:extLst>
               </a:tr>
@@ -12353,7 +12107,7 @@
                 </a:tc>
                 <a:extLst>
                   <a:ext uri="{0D108BD9-81ED-4DB2-BD59-A6C34878D82A}">
-                    <a16:rowId xmlns:a16="http://schemas.microsoft.com/office/drawing/2014/main" xmlns="" val="2088053448"/>
+                    <a16:rowId xmlns:a16="http://schemas.microsoft.com/office/drawing/2014/main" val="2088053448"/>
                   </a:ext>
                 </a:extLst>
               </a:tr>
@@ -12405,7 +12159,7 @@
                 </a:tc>
                 <a:extLst>
                   <a:ext uri="{0D108BD9-81ED-4DB2-BD59-A6C34878D82A}">
-                    <a16:rowId xmlns:a16="http://schemas.microsoft.com/office/drawing/2014/main" xmlns="" val="4163736797"/>
+                    <a16:rowId xmlns:a16="http://schemas.microsoft.com/office/drawing/2014/main" val="4163736797"/>
                   </a:ext>
                 </a:extLst>
               </a:tr>
@@ -12774,7 +12528,7 @@
   <a:extraClrSchemeLst/>
   <a:extLst>
     <a:ext uri="{05A4C25C-085E-4340-85A3-A5531E510DB2}">
-      <thm15:themeFamily xmlns:thm15="http://schemas.microsoft.com/office/thememl/2012/main" xmlns="" name="Facet" id="{C0C680CD-088A-49FC-A102-D699147F32B2}" vid="{0B5AB586-D108-4FC1-8368-649FE654B894}"/>
+      <thm15:themeFamily xmlns:thm15="http://schemas.microsoft.com/office/thememl/2012/main" name="Facet" id="{C0C680CD-088A-49FC-A102-D699147F32B2}" vid="{0B5AB586-D108-4FC1-8368-649FE654B894}"/>
     </a:ext>
   </a:extLst>
 </a:theme>

</xml_diff>